<commit_message>
[ADD] session 4 exercises slides
</commit_message>
<xml_diff>
--- a/lectures/DL-Session04.pptx
+++ b/lectures/DL-Session04.pptx
@@ -31,6 +31,7 @@
     <p:sldId id="384" r:id="rId25"/>
     <p:sldId id="386" r:id="rId26"/>
     <p:sldId id="385" r:id="rId27"/>
+    <p:sldId id="387" r:id="rId28"/>
   </p:sldIdLst>
   <p:sldSz cx="12192000" cy="6858000"/>
   <p:notesSz cx="6858000" cy="9144000"/>
@@ -142,7 +143,7 @@
   <p1510:revLst>
     <p1510:client id="{246D3490-0678-8913-0B87-F5551F5BA97B}" v="709" dt="2024-09-26T11:00:23.794"/>
     <p1510:client id="{AEC5B560-211D-F632-020A-DAABF0B6B21B}" v="421" dt="2024-09-25T21:04:03.104"/>
-    <p1510:client id="{E2F98A2A-5AAD-3D58-E8CB-C0FACECADC7A}" v="784" dt="2024-09-24T15:12:18.400"/>
+    <p1510:client id="{C3C08B1F-3C4A-F814-B940-708D9715DBBA}" v="53" dt="2024-09-26T20:09:25.226"/>
   </p1510:revLst>
 </p1510:revInfo>
 </file>
@@ -16697,6 +16698,720 @@
 </p:sld>
 </file>
 
+<file path=ppt/slides/slide27.xml><?xml version="1.0" encoding="utf-8"?>
+<p:sld xmlns:a="http://schemas.openxmlformats.org/drawingml/2006/main" xmlns:r="http://schemas.openxmlformats.org/officeDocument/2006/relationships" xmlns:p="http://schemas.openxmlformats.org/presentationml/2006/main">
+  <p:cSld>
+    <p:spTree>
+      <p:nvGrpSpPr>
+        <p:cNvPr id="1" name=""/>
+        <p:cNvGrpSpPr/>
+        <p:nvPr/>
+      </p:nvGrpSpPr>
+      <p:grpSpPr>
+        <a:xfrm>
+          <a:off x="0" y="0"/>
+          <a:ext cx="0" cy="0"/>
+          <a:chOff x="0" y="0"/>
+          <a:chExt cx="0" cy="0"/>
+        </a:xfrm>
+      </p:grpSpPr>
+      <p:sp>
+        <p:nvSpPr>
+          <p:cNvPr id="2" name="Título 1">
+            <a:extLst>
+              <a:ext uri="{FF2B5EF4-FFF2-40B4-BE49-F238E27FC236}">
+                <a16:creationId xmlns:a16="http://schemas.microsoft.com/office/drawing/2014/main" id="{4D56E20A-6DB5-4A6B-9EEB-FA9732C72527}"/>
+              </a:ext>
+            </a:extLst>
+          </p:cNvPr>
+          <p:cNvSpPr>
+            <a:spLocks noGrp="1"/>
+          </p:cNvSpPr>
+          <p:nvPr>
+            <p:ph type="title"/>
+          </p:nvPr>
+        </p:nvSpPr>
+        <p:spPr>
+          <a:xfrm>
+            <a:off x="170048" y="-177"/>
+            <a:ext cx="10515600" cy="1325563"/>
+          </a:xfrm>
+        </p:spPr>
+        <p:txBody>
+          <a:bodyPr>
+            <a:normAutofit/>
+          </a:bodyPr>
+          <a:lstStyle/>
+          <a:p>
+            <a:r>
+              <a:rPr lang="pt-PT" sz="3600" b="1" dirty="0" err="1">
+                <a:solidFill>
+                  <a:srgbClr val="092953"/>
+                </a:solidFill>
+                <a:latin typeface="Cambria"/>
+                <a:ea typeface="Cambria"/>
+              </a:rPr>
+              <a:t>Exercise</a:t>
+            </a:r>
+          </a:p>
+        </p:txBody>
+      </p:sp>
+      <p:sp>
+        <p:nvSpPr>
+          <p:cNvPr id="3" name="Marcador de Posição de Conteúdo 2">
+            <a:extLst>
+              <a:ext uri="{FF2B5EF4-FFF2-40B4-BE49-F238E27FC236}">
+                <a16:creationId xmlns:a16="http://schemas.microsoft.com/office/drawing/2014/main" id="{1B32614E-E287-1059-727D-571681FEAF1D}"/>
+              </a:ext>
+            </a:extLst>
+          </p:cNvPr>
+          <p:cNvSpPr>
+            <a:spLocks noGrp="1"/>
+          </p:cNvSpPr>
+          <p:nvPr>
+            <p:ph idx="1"/>
+          </p:nvPr>
+        </p:nvSpPr>
+        <p:spPr>
+          <a:xfrm>
+            <a:off x="548426" y="1321203"/>
+            <a:ext cx="10515600" cy="5230829"/>
+          </a:xfrm>
+        </p:spPr>
+        <p:txBody>
+          <a:bodyPr vert="horz" lIns="91440" tIns="45720" rIns="91440" bIns="45720" rtlCol="0" anchor="t">
+            <a:normAutofit/>
+          </a:bodyPr>
+          <a:lstStyle/>
+          <a:p>
+            <a:pPr algn="just"/>
+            <a:r>
+              <a:rPr lang="pt-PT" sz="3000" err="1">
+                <a:ea typeface="+mn-lt"/>
+                <a:cs typeface="+mn-lt"/>
+              </a:rPr>
+              <a:t>End</a:t>
+            </a:r>
+            <a:r>
+              <a:rPr lang="pt-PT" sz="3000" dirty="0">
+                <a:ea typeface="+mn-lt"/>
+                <a:cs typeface="+mn-lt"/>
+              </a:rPr>
+              <a:t>-to-</a:t>
+            </a:r>
+            <a:r>
+              <a:rPr lang="pt-PT" sz="3000" err="1">
+                <a:ea typeface="+mn-lt"/>
+                <a:cs typeface="+mn-lt"/>
+              </a:rPr>
+              <a:t>End</a:t>
+            </a:r>
+            <a:r>
+              <a:rPr lang="pt-PT" sz="3000" dirty="0">
+                <a:ea typeface="+mn-lt"/>
+                <a:cs typeface="+mn-lt"/>
+              </a:rPr>
+              <a:t> </a:t>
+            </a:r>
+            <a:r>
+              <a:rPr lang="pt-PT" sz="3000" err="1">
+                <a:ea typeface="+mn-lt"/>
+                <a:cs typeface="+mn-lt"/>
+              </a:rPr>
+              <a:t>PyTorch</a:t>
+            </a:r>
+            <a:r>
+              <a:rPr lang="pt-PT" sz="3000" dirty="0">
+                <a:ea typeface="+mn-lt"/>
+                <a:cs typeface="+mn-lt"/>
+              </a:rPr>
+              <a:t> </a:t>
+            </a:r>
+            <a:r>
+              <a:rPr lang="pt-PT" sz="3000" err="1">
+                <a:ea typeface="+mn-lt"/>
+                <a:cs typeface="+mn-lt"/>
+              </a:rPr>
+              <a:t>exercise</a:t>
+            </a:r>
+            <a:endParaRPr lang="pt-PT" err="1"/>
+          </a:p>
+          <a:p>
+            <a:pPr marL="0" indent="0" algn="just">
+              <a:buNone/>
+            </a:pPr>
+            <a:r>
+              <a:rPr lang="pt-PT" sz="2600" dirty="0">
+                <a:ea typeface="+mn-lt"/>
+                <a:cs typeface="+mn-lt"/>
+              </a:rPr>
+              <a:t>  1. </a:t>
+            </a:r>
+            <a:r>
+              <a:rPr lang="pt-PT" sz="2600" err="1">
+                <a:ea typeface="+mn-lt"/>
+                <a:cs typeface="+mn-lt"/>
+              </a:rPr>
+              <a:t>Load</a:t>
+            </a:r>
+            <a:r>
+              <a:rPr lang="pt-PT" sz="2600" dirty="0">
+                <a:ea typeface="+mn-lt"/>
+                <a:cs typeface="+mn-lt"/>
+              </a:rPr>
+              <a:t> </a:t>
+            </a:r>
+            <a:r>
+              <a:rPr lang="pt-PT" sz="2600" err="1">
+                <a:ea typeface="+mn-lt"/>
+                <a:cs typeface="+mn-lt"/>
+              </a:rPr>
+              <a:t>the</a:t>
+            </a:r>
+            <a:r>
+              <a:rPr lang="pt-PT" sz="2600">
+                <a:ea typeface="+mn-lt"/>
+                <a:cs typeface="+mn-lt"/>
+              </a:rPr>
+              <a:t> data</a:t>
+            </a:r>
+            <a:endParaRPr lang="pt-PT">
+              <a:ea typeface="+mn-lt"/>
+              <a:cs typeface="+mn-lt"/>
+            </a:endParaRPr>
+          </a:p>
+          <a:p>
+            <a:pPr marL="0" indent="0" algn="just">
+              <a:buNone/>
+            </a:pPr>
+            <a:r>
+              <a:rPr lang="pt-PT" sz="2600" dirty="0">
+                <a:ea typeface="+mn-lt"/>
+                <a:cs typeface="+mn-lt"/>
+              </a:rPr>
+              <a:t>  2. Define </a:t>
+            </a:r>
+            <a:r>
+              <a:rPr lang="pt-PT" sz="2600" dirty="0" err="1">
+                <a:ea typeface="+mn-lt"/>
+                <a:cs typeface="+mn-lt"/>
+              </a:rPr>
+              <a:t>the</a:t>
+            </a:r>
+            <a:r>
+              <a:rPr lang="pt-PT" sz="2600" dirty="0">
+                <a:ea typeface="+mn-lt"/>
+                <a:cs typeface="+mn-lt"/>
+              </a:rPr>
+              <a:t> </a:t>
+            </a:r>
+            <a:r>
+              <a:rPr lang="pt-PT" sz="2600" dirty="0" err="1">
+                <a:ea typeface="+mn-lt"/>
+                <a:cs typeface="+mn-lt"/>
+              </a:rPr>
+              <a:t>model</a:t>
+            </a:r>
+            <a:endParaRPr lang="pt-PT" dirty="0" err="1">
+              <a:ea typeface="+mn-lt"/>
+              <a:cs typeface="+mn-lt"/>
+            </a:endParaRPr>
+          </a:p>
+          <a:p>
+            <a:pPr marL="0" indent="0" algn="just">
+              <a:buNone/>
+            </a:pPr>
+            <a:r>
+              <a:rPr lang="pt-PT" sz="2600" dirty="0">
+                <a:ea typeface="+mn-lt"/>
+                <a:cs typeface="+mn-lt"/>
+              </a:rPr>
+              <a:t>  3. Define </a:t>
+            </a:r>
+            <a:r>
+              <a:rPr lang="pt-PT" sz="2600" dirty="0" err="1">
+                <a:ea typeface="+mn-lt"/>
+                <a:cs typeface="+mn-lt"/>
+              </a:rPr>
+              <a:t>the</a:t>
+            </a:r>
+            <a:r>
+              <a:rPr lang="pt-PT" sz="2600" dirty="0">
+                <a:ea typeface="+mn-lt"/>
+                <a:cs typeface="+mn-lt"/>
+              </a:rPr>
+              <a:t> </a:t>
+            </a:r>
+            <a:r>
+              <a:rPr lang="pt-PT" sz="2600" dirty="0" err="1">
+                <a:ea typeface="+mn-lt"/>
+                <a:cs typeface="+mn-lt"/>
+              </a:rPr>
+              <a:t>loss</a:t>
+            </a:r>
+            <a:r>
+              <a:rPr lang="pt-PT" sz="2600" dirty="0">
+                <a:ea typeface="+mn-lt"/>
+                <a:cs typeface="+mn-lt"/>
+              </a:rPr>
+              <a:t> </a:t>
+            </a:r>
+            <a:r>
+              <a:rPr lang="pt-PT" sz="2600" dirty="0" err="1">
+                <a:ea typeface="+mn-lt"/>
+                <a:cs typeface="+mn-lt"/>
+              </a:rPr>
+              <a:t>function</a:t>
+            </a:r>
+            <a:endParaRPr lang="pt-PT" dirty="0" err="1">
+              <a:ea typeface="+mn-lt"/>
+              <a:cs typeface="+mn-lt"/>
+            </a:endParaRPr>
+          </a:p>
+          <a:p>
+            <a:pPr marL="0" indent="0" algn="just">
+              <a:buNone/>
+            </a:pPr>
+            <a:r>
+              <a:rPr lang="pt-PT" sz="2600" dirty="0">
+                <a:ea typeface="+mn-lt"/>
+                <a:cs typeface="+mn-lt"/>
+              </a:rPr>
+              <a:t>  4. Define </a:t>
+            </a:r>
+            <a:r>
+              <a:rPr lang="pt-PT" sz="2600" dirty="0" err="1">
+                <a:ea typeface="+mn-lt"/>
+                <a:cs typeface="+mn-lt"/>
+              </a:rPr>
+              <a:t>the</a:t>
+            </a:r>
+            <a:r>
+              <a:rPr lang="pt-PT" sz="2600" dirty="0">
+                <a:ea typeface="+mn-lt"/>
+                <a:cs typeface="+mn-lt"/>
+              </a:rPr>
+              <a:t> </a:t>
+            </a:r>
+            <a:r>
+              <a:rPr lang="pt-PT" sz="2600" dirty="0" err="1">
+                <a:ea typeface="+mn-lt"/>
+                <a:cs typeface="+mn-lt"/>
+              </a:rPr>
+              <a:t>optimizer</a:t>
+            </a:r>
+            <a:endParaRPr lang="pt-PT" dirty="0" err="1">
+              <a:ea typeface="+mn-lt"/>
+              <a:cs typeface="+mn-lt"/>
+            </a:endParaRPr>
+          </a:p>
+          <a:p>
+            <a:pPr marL="0" indent="0" algn="just">
+              <a:buNone/>
+            </a:pPr>
+            <a:r>
+              <a:rPr lang="pt-PT" sz="2600" dirty="0">
+                <a:ea typeface="+mn-lt"/>
+                <a:cs typeface="+mn-lt"/>
+              </a:rPr>
+              <a:t>  5. </a:t>
+            </a:r>
+            <a:r>
+              <a:rPr lang="pt-PT" sz="2600" dirty="0" err="1">
+                <a:ea typeface="+mn-lt"/>
+                <a:cs typeface="+mn-lt"/>
+              </a:rPr>
+              <a:t>Train</a:t>
+            </a:r>
+            <a:r>
+              <a:rPr lang="pt-PT" sz="2600" dirty="0">
+                <a:ea typeface="+mn-lt"/>
+                <a:cs typeface="+mn-lt"/>
+              </a:rPr>
+              <a:t> </a:t>
+            </a:r>
+            <a:r>
+              <a:rPr lang="pt-PT" sz="2600" dirty="0" err="1">
+                <a:ea typeface="+mn-lt"/>
+                <a:cs typeface="+mn-lt"/>
+              </a:rPr>
+              <a:t>the</a:t>
+            </a:r>
+            <a:r>
+              <a:rPr lang="pt-PT" sz="2600" dirty="0">
+                <a:ea typeface="+mn-lt"/>
+                <a:cs typeface="+mn-lt"/>
+              </a:rPr>
+              <a:t> </a:t>
+            </a:r>
+            <a:r>
+              <a:rPr lang="pt-PT" sz="2600" dirty="0" err="1">
+                <a:ea typeface="+mn-lt"/>
+                <a:cs typeface="+mn-lt"/>
+              </a:rPr>
+              <a:t>model</a:t>
+            </a:r>
+            <a:endParaRPr lang="pt-PT" dirty="0" err="1">
+              <a:ea typeface="+mn-lt"/>
+              <a:cs typeface="+mn-lt"/>
+            </a:endParaRPr>
+          </a:p>
+          <a:p>
+            <a:pPr marL="0" indent="0" algn="just">
+              <a:buNone/>
+            </a:pPr>
+            <a:r>
+              <a:rPr lang="pt-PT" sz="2600">
+                <a:ea typeface="+mn-lt"/>
+                <a:cs typeface="+mn-lt"/>
+              </a:rPr>
+              <a:t>  6. </a:t>
+            </a:r>
+            <a:r>
+              <a:rPr lang="pt-PT" sz="2600" err="1">
+                <a:ea typeface="+mn-lt"/>
+                <a:cs typeface="+mn-lt"/>
+              </a:rPr>
+              <a:t>Make</a:t>
+            </a:r>
+            <a:r>
+              <a:rPr lang="pt-PT" sz="2600" dirty="0">
+                <a:ea typeface="+mn-lt"/>
+                <a:cs typeface="+mn-lt"/>
+              </a:rPr>
+              <a:t> </a:t>
+            </a:r>
+            <a:r>
+              <a:rPr lang="pt-PT" sz="2600" err="1">
+                <a:ea typeface="+mn-lt"/>
+                <a:cs typeface="+mn-lt"/>
+              </a:rPr>
+              <a:t>predictions</a:t>
+            </a:r>
+            <a:endParaRPr lang="pt-PT"/>
+          </a:p>
+          <a:p>
+            <a:pPr lvl="1" algn="just">
+              <a:buFont typeface="Courier New" panose="020B0604020202020204" pitchFamily="34" charset="0"/>
+              <a:buChar char="o"/>
+            </a:pPr>
+            <a:endParaRPr lang="pt-PT" sz="2600" dirty="0">
+              <a:ea typeface="+mn-lt"/>
+              <a:cs typeface="+mn-lt"/>
+            </a:endParaRPr>
+          </a:p>
+        </p:txBody>
+      </p:sp>
+      <p:sp>
+        <p:nvSpPr>
+          <p:cNvPr id="4" name="Retângulo 3">
+            <a:extLst>
+              <a:ext uri="{FF2B5EF4-FFF2-40B4-BE49-F238E27FC236}">
+                <a16:creationId xmlns:a16="http://schemas.microsoft.com/office/drawing/2014/main" id="{C49AACF5-CCF4-E6B6-98B5-BF66BBB3419C}"/>
+              </a:ext>
+            </a:extLst>
+          </p:cNvPr>
+          <p:cNvSpPr/>
+          <p:nvPr/>
+        </p:nvSpPr>
+        <p:spPr>
+          <a:xfrm>
+            <a:off x="0" y="6626645"/>
+            <a:ext cx="12192000" cy="231355"/>
+          </a:xfrm>
+          <a:prstGeom prst="rect">
+            <a:avLst/>
+          </a:prstGeom>
+          <a:solidFill>
+            <a:srgbClr val="092953"/>
+          </a:solidFill>
+          <a:ln>
+            <a:solidFill>
+              <a:srgbClr val="092953"/>
+            </a:solidFill>
+          </a:ln>
+        </p:spPr>
+        <p:style>
+          <a:lnRef idx="2">
+            <a:schemeClr val="accent1">
+              <a:shade val="15000"/>
+            </a:schemeClr>
+          </a:lnRef>
+          <a:fillRef idx="1">
+            <a:schemeClr val="accent1"/>
+          </a:fillRef>
+          <a:effectRef idx="0">
+            <a:schemeClr val="accent1"/>
+          </a:effectRef>
+          <a:fontRef idx="minor">
+            <a:schemeClr val="lt1"/>
+          </a:fontRef>
+        </p:style>
+        <p:txBody>
+          <a:bodyPr rot="0" spcFirstLastPara="0" vert="horz" wrap="square" lIns="91440" tIns="45720" rIns="91440" bIns="45720" numCol="1" spcCol="0" rtlCol="0" fromWordArt="0" anchor="ctr" anchorCtr="0" forceAA="0" compatLnSpc="1">
+            <a:prstTxWarp prst="textNoShape">
+              <a:avLst/>
+            </a:prstTxWarp>
+            <a:noAutofit/>
+          </a:bodyPr>
+          <a:lstStyle>
+            <a:defPPr>
+              <a:defRPr lang="pt-PT"/>
+            </a:defPPr>
+            <a:lvl1pPr marL="0" algn="l" defTabSz="914400" rtl="0" eaLnBrk="1" latinLnBrk="0" hangingPunct="1">
+              <a:defRPr sz="1800" kern="1200">
+                <a:solidFill>
+                  <a:schemeClr val="lt1"/>
+                </a:solidFill>
+                <a:latin typeface="+mn-lt"/>
+                <a:ea typeface="+mn-ea"/>
+                <a:cs typeface="+mn-cs"/>
+              </a:defRPr>
+            </a:lvl1pPr>
+            <a:lvl2pPr marL="457200" algn="l" defTabSz="914400" rtl="0" eaLnBrk="1" latinLnBrk="0" hangingPunct="1">
+              <a:defRPr sz="1800" kern="1200">
+                <a:solidFill>
+                  <a:schemeClr val="lt1"/>
+                </a:solidFill>
+                <a:latin typeface="+mn-lt"/>
+                <a:ea typeface="+mn-ea"/>
+                <a:cs typeface="+mn-cs"/>
+              </a:defRPr>
+            </a:lvl2pPr>
+            <a:lvl3pPr marL="914400" algn="l" defTabSz="914400" rtl="0" eaLnBrk="1" latinLnBrk="0" hangingPunct="1">
+              <a:defRPr sz="1800" kern="1200">
+                <a:solidFill>
+                  <a:schemeClr val="lt1"/>
+                </a:solidFill>
+                <a:latin typeface="+mn-lt"/>
+                <a:ea typeface="+mn-ea"/>
+                <a:cs typeface="+mn-cs"/>
+              </a:defRPr>
+            </a:lvl3pPr>
+            <a:lvl4pPr marL="1371600" algn="l" defTabSz="914400" rtl="0" eaLnBrk="1" latinLnBrk="0" hangingPunct="1">
+              <a:defRPr sz="1800" kern="1200">
+                <a:solidFill>
+                  <a:schemeClr val="lt1"/>
+                </a:solidFill>
+                <a:latin typeface="+mn-lt"/>
+                <a:ea typeface="+mn-ea"/>
+                <a:cs typeface="+mn-cs"/>
+              </a:defRPr>
+            </a:lvl4pPr>
+            <a:lvl5pPr marL="1828800" algn="l" defTabSz="914400" rtl="0" eaLnBrk="1" latinLnBrk="0" hangingPunct="1">
+              <a:defRPr sz="1800" kern="1200">
+                <a:solidFill>
+                  <a:schemeClr val="lt1"/>
+                </a:solidFill>
+                <a:latin typeface="+mn-lt"/>
+                <a:ea typeface="+mn-ea"/>
+                <a:cs typeface="+mn-cs"/>
+              </a:defRPr>
+            </a:lvl5pPr>
+            <a:lvl6pPr marL="2286000" algn="l" defTabSz="914400" rtl="0" eaLnBrk="1" latinLnBrk="0" hangingPunct="1">
+              <a:defRPr sz="1800" kern="1200">
+                <a:solidFill>
+                  <a:schemeClr val="lt1"/>
+                </a:solidFill>
+                <a:latin typeface="+mn-lt"/>
+                <a:ea typeface="+mn-ea"/>
+                <a:cs typeface="+mn-cs"/>
+              </a:defRPr>
+            </a:lvl6pPr>
+            <a:lvl7pPr marL="2743200" algn="l" defTabSz="914400" rtl="0" eaLnBrk="1" latinLnBrk="0" hangingPunct="1">
+              <a:defRPr sz="1800" kern="1200">
+                <a:solidFill>
+                  <a:schemeClr val="lt1"/>
+                </a:solidFill>
+                <a:latin typeface="+mn-lt"/>
+                <a:ea typeface="+mn-ea"/>
+                <a:cs typeface="+mn-cs"/>
+              </a:defRPr>
+            </a:lvl7pPr>
+            <a:lvl8pPr marL="3200400" algn="l" defTabSz="914400" rtl="0" eaLnBrk="1" latinLnBrk="0" hangingPunct="1">
+              <a:defRPr sz="1800" kern="1200">
+                <a:solidFill>
+                  <a:schemeClr val="lt1"/>
+                </a:solidFill>
+                <a:latin typeface="+mn-lt"/>
+                <a:ea typeface="+mn-ea"/>
+                <a:cs typeface="+mn-cs"/>
+              </a:defRPr>
+            </a:lvl8pPr>
+            <a:lvl9pPr marL="3657600" algn="l" defTabSz="914400" rtl="0" eaLnBrk="1" latinLnBrk="0" hangingPunct="1">
+              <a:defRPr sz="1800" kern="1200">
+                <a:solidFill>
+                  <a:schemeClr val="lt1"/>
+                </a:solidFill>
+                <a:latin typeface="+mn-lt"/>
+                <a:ea typeface="+mn-ea"/>
+                <a:cs typeface="+mn-cs"/>
+              </a:defRPr>
+            </a:lvl9pPr>
+          </a:lstStyle>
+          <a:p>
+            <a:pPr algn="ctr"/>
+            <a:endParaRPr lang="pt-PT"/>
+          </a:p>
+        </p:txBody>
+      </p:sp>
+      <p:pic>
+        <p:nvPicPr>
+          <p:cNvPr id="7" name="Imagem 6" descr="Portal do Colaborador">
+            <a:extLst>
+              <a:ext uri="{FF2B5EF4-FFF2-40B4-BE49-F238E27FC236}">
+                <a16:creationId xmlns:a16="http://schemas.microsoft.com/office/drawing/2014/main" id="{A59B6DA3-4BA1-94F4-4AA2-59A6261305AE}"/>
+              </a:ext>
+            </a:extLst>
+          </p:cNvPr>
+          <p:cNvPicPr>
+            <a:picLocks noChangeAspect="1"/>
+          </p:cNvPicPr>
+          <p:nvPr/>
+        </p:nvPicPr>
+        <p:blipFill>
+          <a:blip r:embed="rId2"/>
+          <a:stretch>
+            <a:fillRect/>
+          </a:stretch>
+        </p:blipFill>
+        <p:spPr>
+          <a:xfrm>
+            <a:off x="10199775" y="117119"/>
+            <a:ext cx="1877314" cy="869240"/>
+          </a:xfrm>
+          <a:prstGeom prst="rect">
+            <a:avLst/>
+          </a:prstGeom>
+        </p:spPr>
+      </p:pic>
+      <p:sp>
+        <p:nvSpPr>
+          <p:cNvPr id="5" name="CaixaDeTexto 4">
+            <a:extLst>
+              <a:ext uri="{FF2B5EF4-FFF2-40B4-BE49-F238E27FC236}">
+                <a16:creationId xmlns:a16="http://schemas.microsoft.com/office/drawing/2014/main" id="{57F2B5C7-69A2-D265-A0CC-A46D2F230199}"/>
+              </a:ext>
+            </a:extLst>
+          </p:cNvPr>
+          <p:cNvSpPr txBox="1"/>
+          <p:nvPr/>
+        </p:nvSpPr>
+        <p:spPr>
+          <a:xfrm>
+            <a:off x="60594" y="6624809"/>
+            <a:ext cx="6801079" cy="230832"/>
+          </a:xfrm>
+          <a:prstGeom prst="rect">
+            <a:avLst/>
+          </a:prstGeom>
+          <a:noFill/>
+        </p:spPr>
+        <p:txBody>
+          <a:bodyPr rot="0" spcFirstLastPara="0" vertOverflow="overflow" horzOverflow="overflow" vert="horz" wrap="square" lIns="91440" tIns="45720" rIns="91440" bIns="45720" numCol="1" spcCol="0" rtlCol="0" fromWordArt="0" anchor="t" anchorCtr="0" forceAA="0" compatLnSpc="1">
+            <a:prstTxWarp prst="textNoShape">
+              <a:avLst/>
+            </a:prstTxWarp>
+            <a:spAutoFit/>
+          </a:bodyPr>
+          <a:lstStyle/>
+          <a:p>
+            <a:r>
+              <a:rPr lang="pt-PT" sz="900" dirty="0" err="1">
+                <a:solidFill>
+                  <a:srgbClr val="FFFFFF"/>
+                </a:solidFill>
+              </a:rPr>
+              <a:t>Introduction</a:t>
+            </a:r>
+            <a:r>
+              <a:rPr lang="pt-PT" sz="900" dirty="0">
+                <a:solidFill>
+                  <a:srgbClr val="FFFFFF"/>
+                </a:solidFill>
+              </a:rPr>
+              <a:t> to </a:t>
+            </a:r>
+            <a:r>
+              <a:rPr lang="pt-PT" sz="900" dirty="0" err="1">
+                <a:solidFill>
+                  <a:srgbClr val="FFFFFF"/>
+                </a:solidFill>
+              </a:rPr>
+              <a:t>PyTorch</a:t>
+            </a:r>
+          </a:p>
+        </p:txBody>
+      </p:sp>
+      <p:sp>
+        <p:nvSpPr>
+          <p:cNvPr id="6" name="CaixaDeTexto 5">
+            <a:extLst>
+              <a:ext uri="{FF2B5EF4-FFF2-40B4-BE49-F238E27FC236}">
+                <a16:creationId xmlns:a16="http://schemas.microsoft.com/office/drawing/2014/main" id="{AE4BAC88-6A2B-E578-4ABE-EF35CB42086C}"/>
+              </a:ext>
+            </a:extLst>
+          </p:cNvPr>
+          <p:cNvSpPr txBox="1"/>
+          <p:nvPr/>
+        </p:nvSpPr>
+        <p:spPr>
+          <a:xfrm>
+            <a:off x="5275244" y="6624808"/>
+            <a:ext cx="6801079" cy="230832"/>
+          </a:xfrm>
+          <a:prstGeom prst="rect">
+            <a:avLst/>
+          </a:prstGeom>
+          <a:noFill/>
+        </p:spPr>
+        <p:txBody>
+          <a:bodyPr rot="0" spcFirstLastPara="0" vertOverflow="overflow" horzOverflow="overflow" vert="horz" wrap="square" lIns="91440" tIns="45720" rIns="91440" bIns="45720" numCol="1" spcCol="0" rtlCol="0" fromWordArt="0" anchor="t" anchorCtr="0" forceAA="0" compatLnSpc="1">
+            <a:prstTxWarp prst="textNoShape">
+              <a:avLst/>
+            </a:prstTxWarp>
+            <a:spAutoFit/>
+          </a:bodyPr>
+          <a:lstStyle/>
+          <a:p>
+            <a:pPr algn="r"/>
+            <a:r>
+              <a:rPr lang="pt-PT" sz="900" dirty="0" err="1">
+                <a:solidFill>
+                  <a:srgbClr val="FFFFFF"/>
+                </a:solidFill>
+                <a:latin typeface="Times New Roman"/>
+                <a:cs typeface="Times New Roman"/>
+              </a:rPr>
+              <a:t>Session</a:t>
+            </a:r>
+            <a:r>
+              <a:rPr lang="pt-PT" sz="900" dirty="0">
+                <a:solidFill>
+                  <a:srgbClr val="FFFFFF"/>
+                </a:solidFill>
+                <a:latin typeface="Times New Roman"/>
+                <a:cs typeface="Times New Roman"/>
+              </a:rPr>
+              <a:t> 3</a:t>
+            </a:r>
+            <a:endParaRPr lang="pt-PT" dirty="0"/>
+          </a:p>
+        </p:txBody>
+      </p:sp>
+    </p:spTree>
+    <p:extLst>
+      <p:ext uri="{BB962C8B-B14F-4D97-AF65-F5344CB8AC3E}">
+        <p14:creationId xmlns:p14="http://schemas.microsoft.com/office/powerpoint/2010/main" val="1633583778"/>
+      </p:ext>
+    </p:extLst>
+  </p:cSld>
+  <p:clrMapOvr>
+    <a:masterClrMapping/>
+  </p:clrMapOvr>
+</p:sld>
+</file>
+
 <file path=ppt/slides/slide3.xml><?xml version="1.0" encoding="utf-8"?>
 <p:sld xmlns:a="http://schemas.openxmlformats.org/drawingml/2006/main" xmlns:r="http://schemas.openxmlformats.org/officeDocument/2006/relationships" xmlns:p="http://schemas.openxmlformats.org/presentationml/2006/main">
   <p:cSld>

</xml_diff>